<commit_message>
Presentacion de la propuesta del proyecto
</commit_message>
<xml_diff>
--- a/Propuesta_de_Proyecto.pptx
+++ b/Propuesta_de_Proyecto.pptx
@@ -118,7 +118,7 @@
   </p:defaultTextStyle>
   <p:extLst>
     <p:ext uri="{EFAFB233-063F-42B5-8137-9DF3F51BA10A}">
-      <p15:sldGuideLst xmlns:p15="http://schemas.microsoft.com/office/powerpoint/2012/main" xmlns="">
+      <p15:sldGuideLst xmlns="" xmlns:p15="http://schemas.microsoft.com/office/powerpoint/2012/main">
         <p15:guide id="1" orient="horz" pos="2160">
           <p15:clr>
             <a:srgbClr val="A4A3A4"/>
@@ -6177,7 +6177,7 @@
         </p:spPr>
         <p:txBody>
           <a:bodyPr>
-            <a:normAutofit lnSpcReduction="10000"/>
+            <a:normAutofit fontScale="92500" lnSpcReduction="20000"/>
           </a:bodyPr>
           <a:lstStyle/>
           <a:p>
@@ -6247,8 +6247,39 @@
                 <a:latin typeface="Times New Roman" panose="02020603050405020304" pitchFamily="18" charset="0"/>
                 <a:cs typeface="Times New Roman" panose="02020603050405020304" pitchFamily="18" charset="0"/>
               </a:rPr>
-              <a:t>David Hernandez</a:t>
-            </a:r>
+              <a:t>David </a:t>
+            </a:r>
+            <a:r>
+              <a:rPr lang="es-ES" dirty="0" err="1" smtClean="0">
+                <a:latin typeface="Times New Roman" panose="02020603050405020304" pitchFamily="18" charset="0"/>
+                <a:cs typeface="Times New Roman" panose="02020603050405020304" pitchFamily="18" charset="0"/>
+              </a:rPr>
+              <a:t>Hernandez</a:t>
+            </a:r>
+            <a:endParaRPr lang="es-ES" dirty="0" smtClean="0">
+              <a:latin typeface="Times New Roman" panose="02020603050405020304" pitchFamily="18" charset="0"/>
+              <a:cs typeface="Times New Roman" panose="02020603050405020304" pitchFamily="18" charset="0"/>
+            </a:endParaRPr>
+          </a:p>
+          <a:p>
+            <a:r>
+              <a:rPr lang="es-ES" dirty="0" err="1" smtClean="0">
+                <a:latin typeface="Times New Roman" panose="02020603050405020304" pitchFamily="18" charset="0"/>
+                <a:cs typeface="Times New Roman" panose="02020603050405020304" pitchFamily="18" charset="0"/>
+              </a:rPr>
+              <a:t>Josue</a:t>
+            </a:r>
+            <a:r>
+              <a:rPr lang="es-ES" dirty="0" smtClean="0">
+                <a:latin typeface="Times New Roman" panose="02020603050405020304" pitchFamily="18" charset="0"/>
+                <a:cs typeface="Times New Roman" panose="02020603050405020304" pitchFamily="18" charset="0"/>
+              </a:rPr>
+              <a:t> Cando</a:t>
+            </a:r>
+            <a:endParaRPr lang="es-ES" dirty="0">
+              <a:latin typeface="Times New Roman" panose="02020603050405020304" pitchFamily="18" charset="0"/>
+              <a:cs typeface="Times New Roman" panose="02020603050405020304" pitchFamily="18" charset="0"/>
+            </a:endParaRPr>
           </a:p>
         </p:txBody>
       </p:sp>
@@ -8190,7 +8221,7 @@
   <a:extraClrSchemeLst/>
   <a:extLst>
     <a:ext uri="{05A4C25C-085E-4340-85A3-A5531E510DB2}">
-      <thm15:themeFamily xmlns:thm15="http://schemas.microsoft.com/office/thememl/2012/main" xmlns="" name="Parallax" id="{3388167B-A2EB-4685-9635-1831D9AEF8C4}" vid="{4F7A876A-7598-49CA-AFC8-8EDA2551E4A7}"/>
+      <thm15:themeFamily xmlns="" xmlns:thm15="http://schemas.microsoft.com/office/thememl/2012/main" name="Parallax" id="{3388167B-A2EB-4685-9635-1831D9AEF8C4}" vid="{4F7A876A-7598-49CA-AFC8-8EDA2551E4A7}"/>
     </a:ext>
   </a:extLst>
 </a:theme>

</xml_diff>